<commit_message>
Corrected picture and added player modea/b (not fully tested)
</commit_message>
<xml_diff>
--- a/helper/Presentation1.pptx
+++ b/helper/Presentation1.pptx
@@ -3229,29 +3229,7 @@
                   </a:schemeClr>
                 </a:solidFill>
               </a:rPr>
-              <a:t>1       3           6          10        15          21         28         36         45         55        </a:t>
-            </a:r>
-            <a:r>
-              <a:rPr lang="de-DE" sz="5400" b="1" dirty="0" smtClean="0">
-                <a:solidFill>
-                  <a:schemeClr val="tx1">
-                    <a:lumMod val="65000"/>
-                    <a:lumOff val="35000"/>
-                  </a:schemeClr>
-                </a:solidFill>
-              </a:rPr>
-              <a:t>66        </a:t>
-            </a:r>
-            <a:r>
-              <a:rPr lang="de-DE" sz="5400" b="1" dirty="0" smtClean="0">
-                <a:solidFill>
-                  <a:schemeClr val="tx1">
-                    <a:lumMod val="65000"/>
-                    <a:lumOff val="35000"/>
-                  </a:schemeClr>
-                </a:solidFill>
-              </a:rPr>
-              <a:t>78</a:t>
+              <a:t>1       3           6          10        15          21         28         36         45         55        66        78</a:t>
             </a:r>
           </a:p>
           <a:p>
@@ -4265,13 +4243,13 @@
           <a:p>
             <a:pPr algn="ctr"/>
             <a:r>
-              <a:rPr lang="de-DE" sz="12400" b="1" dirty="0">
+              <a:rPr lang="de-DE" sz="12400" b="1" dirty="0" smtClean="0">
                 <a:solidFill>
                   <a:srgbClr val="00A200"/>
                 </a:solidFill>
                 <a:latin typeface="Arial Narrow" panose="020B0606020202030204" pitchFamily="34" charset="0"/>
               </a:rPr>
-              <a:t>2</a:t>
+              <a:t>12</a:t>
             </a:r>
             <a:endParaRPr lang="de-DE" sz="12400" b="1" dirty="0" smtClean="0">
               <a:solidFill>
@@ -4336,14 +4314,20 @@
           <a:p>
             <a:pPr algn="ctr"/>
             <a:r>
-              <a:rPr lang="de-DE" sz="12400" b="1" dirty="0">
+              <a:rPr lang="de-DE" sz="12400" b="1" dirty="0" smtClean="0">
                 <a:solidFill>
                   <a:srgbClr val="00A200"/>
                 </a:solidFill>
                 <a:latin typeface="Arial Narrow" panose="020B0606020202030204" pitchFamily="34" charset="0"/>
               </a:rPr>
-              <a:t>4</a:t>
-            </a:r>
+              <a:t>10</a:t>
+            </a:r>
+            <a:endParaRPr lang="de-DE" sz="12400" b="1" dirty="0">
+              <a:solidFill>
+                <a:srgbClr val="00A200"/>
+              </a:solidFill>
+              <a:latin typeface="Arial Narrow" panose="020B0606020202030204" pitchFamily="34" charset="0"/>
+            </a:endParaRPr>
           </a:p>
         </p:txBody>
       </p:sp>
@@ -4401,14 +4385,20 @@
           <a:p>
             <a:pPr algn="ctr"/>
             <a:r>
-              <a:rPr lang="de-DE" sz="12400" b="1" dirty="0">
+              <a:rPr lang="de-DE" sz="12400" b="1" dirty="0" smtClean="0">
                 <a:solidFill>
                   <a:srgbClr val="00A200"/>
                 </a:solidFill>
                 <a:latin typeface="Arial Narrow" panose="020B0606020202030204" pitchFamily="34" charset="0"/>
               </a:rPr>
-              <a:t>6</a:t>
-            </a:r>
+              <a:t>8</a:t>
+            </a:r>
+            <a:endParaRPr lang="de-DE" sz="12400" b="1" dirty="0">
+              <a:solidFill>
+                <a:srgbClr val="00A200"/>
+              </a:solidFill>
+              <a:latin typeface="Arial Narrow" panose="020B0606020202030204" pitchFamily="34" charset="0"/>
+            </a:endParaRPr>
           </a:p>
         </p:txBody>
       </p:sp>
@@ -4531,14 +4521,20 @@
           <a:p>
             <a:pPr algn="ctr"/>
             <a:r>
-              <a:rPr lang="de-DE" sz="12400" b="1" dirty="0">
+              <a:rPr lang="de-DE" sz="12400" b="1" dirty="0" smtClean="0">
                 <a:solidFill>
                   <a:srgbClr val="00A200"/>
                 </a:solidFill>
                 <a:latin typeface="Arial Narrow" panose="020B0606020202030204" pitchFamily="34" charset="0"/>
               </a:rPr>
-              <a:t>8</a:t>
-            </a:r>
+              <a:t>6</a:t>
+            </a:r>
+            <a:endParaRPr lang="de-DE" sz="12400" b="1" dirty="0">
+              <a:solidFill>
+                <a:srgbClr val="00A200"/>
+              </a:solidFill>
+              <a:latin typeface="Arial Narrow" panose="020B0606020202030204" pitchFamily="34" charset="0"/>
+            </a:endParaRPr>
           </a:p>
         </p:txBody>
       </p:sp>
@@ -4596,14 +4592,20 @@
           <a:p>
             <a:pPr algn="ctr"/>
             <a:r>
-              <a:rPr lang="de-DE" sz="12400" b="1" dirty="0">
+              <a:rPr lang="de-DE" sz="12400" b="1" dirty="0" smtClean="0">
                 <a:solidFill>
                   <a:srgbClr val="00A200"/>
                 </a:solidFill>
                 <a:latin typeface="Arial Narrow" panose="020B0606020202030204" pitchFamily="34" charset="0"/>
               </a:rPr>
-              <a:t>9</a:t>
-            </a:r>
+              <a:t>5</a:t>
+            </a:r>
+            <a:endParaRPr lang="de-DE" sz="12400" b="1" dirty="0">
+              <a:solidFill>
+                <a:srgbClr val="00A200"/>
+              </a:solidFill>
+              <a:latin typeface="Arial Narrow" panose="020B0606020202030204" pitchFamily="34" charset="0"/>
+            </a:endParaRPr>
           </a:p>
         </p:txBody>
       </p:sp>
@@ -4661,14 +4663,20 @@
           <a:p>
             <a:pPr algn="ctr"/>
             <a:r>
-              <a:rPr lang="de-DE" sz="12400" b="1" dirty="0">
+              <a:rPr lang="de-DE" sz="12400" b="1" dirty="0" smtClean="0">
                 <a:solidFill>
                   <a:srgbClr val="00A200"/>
                 </a:solidFill>
                 <a:latin typeface="Arial Narrow" panose="020B0606020202030204" pitchFamily="34" charset="0"/>
               </a:rPr>
-              <a:t>10</a:t>
-            </a:r>
+              <a:t>4</a:t>
+            </a:r>
+            <a:endParaRPr lang="de-DE" sz="12400" b="1" dirty="0">
+              <a:solidFill>
+                <a:srgbClr val="00A200"/>
+              </a:solidFill>
+              <a:latin typeface="Arial Narrow" panose="020B0606020202030204" pitchFamily="34" charset="0"/>
+            </a:endParaRPr>
           </a:p>
         </p:txBody>
       </p:sp>
@@ -4726,14 +4734,20 @@
           <a:p>
             <a:pPr algn="ctr"/>
             <a:r>
-              <a:rPr lang="de-DE" sz="12400" b="1" dirty="0">
+              <a:rPr lang="de-DE" sz="12400" b="1" dirty="0" smtClean="0">
                 <a:solidFill>
                   <a:srgbClr val="00A200"/>
                 </a:solidFill>
                 <a:latin typeface="Arial Narrow" panose="020B0606020202030204" pitchFamily="34" charset="0"/>
               </a:rPr>
-              <a:t>12</a:t>
-            </a:r>
+              <a:t>2</a:t>
+            </a:r>
+            <a:endParaRPr lang="de-DE" sz="12400" b="1" dirty="0">
+              <a:solidFill>
+                <a:srgbClr val="00A200"/>
+              </a:solidFill>
+              <a:latin typeface="Arial Narrow" panose="020B0606020202030204" pitchFamily="34" charset="0"/>
+            </a:endParaRPr>
           </a:p>
         </p:txBody>
       </p:sp>
@@ -4847,14 +4861,20 @@
           <a:p>
             <a:pPr algn="ctr"/>
             <a:r>
-              <a:rPr lang="de-DE" sz="12400" b="1" dirty="0">
+              <a:rPr lang="de-DE" sz="12400" b="1" dirty="0" smtClean="0">
                 <a:solidFill>
                   <a:srgbClr val="00A200"/>
                 </a:solidFill>
                 <a:latin typeface="Arial Narrow" panose="020B0606020202030204" pitchFamily="34" charset="0"/>
               </a:rPr>
-              <a:t>3</a:t>
-            </a:r>
+              <a:t>11</a:t>
+            </a:r>
+            <a:endParaRPr lang="de-DE" sz="12400" b="1" dirty="0">
+              <a:solidFill>
+                <a:srgbClr val="00A200"/>
+              </a:solidFill>
+              <a:latin typeface="Arial Narrow" panose="020B0606020202030204" pitchFamily="34" charset="0"/>
+            </a:endParaRPr>
           </a:p>
         </p:txBody>
       </p:sp>
@@ -4912,14 +4932,20 @@
           <a:p>
             <a:pPr algn="ctr"/>
             <a:r>
-              <a:rPr lang="de-DE" sz="12400" b="1" dirty="0">
+              <a:rPr lang="de-DE" sz="12400" b="1" dirty="0" smtClean="0">
                 <a:solidFill>
                   <a:srgbClr val="00A200"/>
                 </a:solidFill>
                 <a:latin typeface="Arial Narrow" panose="020B0606020202030204" pitchFamily="34" charset="0"/>
               </a:rPr>
-              <a:t>5</a:t>
-            </a:r>
+              <a:t>9</a:t>
+            </a:r>
+            <a:endParaRPr lang="de-DE" sz="12400" b="1" dirty="0">
+              <a:solidFill>
+                <a:srgbClr val="00A200"/>
+              </a:solidFill>
+              <a:latin typeface="Arial Narrow" panose="020B0606020202030204" pitchFamily="34" charset="0"/>
+            </a:endParaRPr>
           </a:p>
         </p:txBody>
       </p:sp>
@@ -4977,14 +5003,20 @@
           <a:p>
             <a:pPr algn="ctr"/>
             <a:r>
-              <a:rPr lang="de-DE" sz="12400" b="1" dirty="0">
+              <a:rPr lang="de-DE" sz="12400" b="1" dirty="0" smtClean="0">
                 <a:solidFill>
                   <a:srgbClr val="00A200"/>
                 </a:solidFill>
                 <a:latin typeface="Arial Narrow" panose="020B0606020202030204" pitchFamily="34" charset="0"/>
               </a:rPr>
-              <a:t>11</a:t>
-            </a:r>
+              <a:t>3</a:t>
+            </a:r>
+            <a:endParaRPr lang="de-DE" sz="12400" b="1" dirty="0">
+              <a:solidFill>
+                <a:srgbClr val="00A200"/>
+              </a:solidFill>
+              <a:latin typeface="Arial Narrow" panose="020B0606020202030204" pitchFamily="34" charset="0"/>
+            </a:endParaRPr>
           </a:p>
         </p:txBody>
       </p:sp>
@@ -5158,7 +5190,7 @@
           <a:p>
             <a:pPr algn="ctr"/>
             <a:r>
-              <a:rPr lang="de-DE" sz="12400" b="1" dirty="0">
+              <a:rPr lang="de-DE" sz="12400" b="1" dirty="0" smtClean="0">
                 <a:solidFill>
                   <a:schemeClr val="accent1">
                     <a:lumMod val="75000"/>
@@ -5166,7 +5198,7 @@
                 </a:solidFill>
                 <a:latin typeface="Arial Narrow" panose="020B0606020202030204" pitchFamily="34" charset="0"/>
               </a:rPr>
-              <a:t>2</a:t>
+              <a:t>12</a:t>
             </a:r>
             <a:endParaRPr lang="de-DE" sz="12400" b="1" dirty="0" smtClean="0">
               <a:solidFill>
@@ -5233,7 +5265,7 @@
           <a:p>
             <a:pPr algn="ctr"/>
             <a:r>
-              <a:rPr lang="de-DE" sz="12400" b="1" dirty="0">
+              <a:rPr lang="de-DE" sz="12400" b="1" dirty="0" smtClean="0">
                 <a:solidFill>
                   <a:schemeClr val="accent1">
                     <a:lumMod val="75000"/>
@@ -5241,8 +5273,16 @@
                 </a:solidFill>
                 <a:latin typeface="Arial Narrow" panose="020B0606020202030204" pitchFamily="34" charset="0"/>
               </a:rPr>
-              <a:t>4</a:t>
-            </a:r>
+              <a:t>10</a:t>
+            </a:r>
+            <a:endParaRPr lang="de-DE" sz="12400" b="1" dirty="0">
+              <a:solidFill>
+                <a:schemeClr val="accent1">
+                  <a:lumMod val="75000"/>
+                </a:schemeClr>
+              </a:solidFill>
+              <a:latin typeface="Arial Narrow" panose="020B0606020202030204" pitchFamily="34" charset="0"/>
+            </a:endParaRPr>
           </a:p>
         </p:txBody>
       </p:sp>
@@ -5300,7 +5340,7 @@
           <a:p>
             <a:pPr algn="ctr"/>
             <a:r>
-              <a:rPr lang="de-DE" sz="12400" b="1" dirty="0">
+              <a:rPr lang="de-DE" sz="12400" b="1" dirty="0" smtClean="0">
                 <a:solidFill>
                   <a:schemeClr val="accent1">
                     <a:lumMod val="75000"/>
@@ -5308,8 +5348,16 @@
                 </a:solidFill>
                 <a:latin typeface="Arial Narrow" panose="020B0606020202030204" pitchFamily="34" charset="0"/>
               </a:rPr>
-              <a:t>6</a:t>
-            </a:r>
+              <a:t>8</a:t>
+            </a:r>
+            <a:endParaRPr lang="de-DE" sz="12400" b="1" dirty="0">
+              <a:solidFill>
+                <a:schemeClr val="accent1">
+                  <a:lumMod val="75000"/>
+                </a:schemeClr>
+              </a:solidFill>
+              <a:latin typeface="Arial Narrow" panose="020B0606020202030204" pitchFamily="34" charset="0"/>
+            </a:endParaRPr>
           </a:p>
         </p:txBody>
       </p:sp>
@@ -5434,7 +5482,7 @@
           <a:p>
             <a:pPr algn="ctr"/>
             <a:r>
-              <a:rPr lang="de-DE" sz="12400" b="1" dirty="0">
+              <a:rPr lang="de-DE" sz="12400" b="1" dirty="0" smtClean="0">
                 <a:solidFill>
                   <a:schemeClr val="accent1">
                     <a:lumMod val="75000"/>
@@ -5442,8 +5490,16 @@
                 </a:solidFill>
                 <a:latin typeface="Arial Narrow" panose="020B0606020202030204" pitchFamily="34" charset="0"/>
               </a:rPr>
-              <a:t>8</a:t>
-            </a:r>
+              <a:t>6</a:t>
+            </a:r>
+            <a:endParaRPr lang="de-DE" sz="12400" b="1" dirty="0">
+              <a:solidFill>
+                <a:schemeClr val="accent1">
+                  <a:lumMod val="75000"/>
+                </a:schemeClr>
+              </a:solidFill>
+              <a:latin typeface="Arial Narrow" panose="020B0606020202030204" pitchFamily="34" charset="0"/>
+            </a:endParaRPr>
           </a:p>
         </p:txBody>
       </p:sp>
@@ -5501,7 +5557,7 @@
           <a:p>
             <a:pPr algn="ctr"/>
             <a:r>
-              <a:rPr lang="de-DE" sz="12400" b="1" dirty="0">
+              <a:rPr lang="de-DE" sz="12400" b="1" dirty="0" smtClean="0">
                 <a:solidFill>
                   <a:schemeClr val="accent1">
                     <a:lumMod val="75000"/>
@@ -5509,8 +5565,16 @@
                 </a:solidFill>
                 <a:latin typeface="Arial Narrow" panose="020B0606020202030204" pitchFamily="34" charset="0"/>
               </a:rPr>
-              <a:t>9</a:t>
-            </a:r>
+              <a:t>5</a:t>
+            </a:r>
+            <a:endParaRPr lang="de-DE" sz="12400" b="1" dirty="0">
+              <a:solidFill>
+                <a:schemeClr val="accent1">
+                  <a:lumMod val="75000"/>
+                </a:schemeClr>
+              </a:solidFill>
+              <a:latin typeface="Arial Narrow" panose="020B0606020202030204" pitchFamily="34" charset="0"/>
+            </a:endParaRPr>
           </a:p>
         </p:txBody>
       </p:sp>
@@ -5568,7 +5632,7 @@
           <a:p>
             <a:pPr algn="ctr"/>
             <a:r>
-              <a:rPr lang="de-DE" sz="12400" b="1" dirty="0">
+              <a:rPr lang="de-DE" sz="12400" b="1" dirty="0" smtClean="0">
                 <a:solidFill>
                   <a:schemeClr val="accent1">
                     <a:lumMod val="75000"/>
@@ -5576,8 +5640,16 @@
                 </a:solidFill>
                 <a:latin typeface="Arial Narrow" panose="020B0606020202030204" pitchFamily="34" charset="0"/>
               </a:rPr>
-              <a:t>10</a:t>
-            </a:r>
+              <a:t>4</a:t>
+            </a:r>
+            <a:endParaRPr lang="de-DE" sz="12400" b="1" dirty="0">
+              <a:solidFill>
+                <a:schemeClr val="accent1">
+                  <a:lumMod val="75000"/>
+                </a:schemeClr>
+              </a:solidFill>
+              <a:latin typeface="Arial Narrow" panose="020B0606020202030204" pitchFamily="34" charset="0"/>
+            </a:endParaRPr>
           </a:p>
         </p:txBody>
       </p:sp>
@@ -5635,7 +5707,7 @@
           <a:p>
             <a:pPr algn="ctr"/>
             <a:r>
-              <a:rPr lang="de-DE" sz="12400" b="1" dirty="0">
+              <a:rPr lang="de-DE" sz="12400" b="1" dirty="0" smtClean="0">
                 <a:solidFill>
                   <a:schemeClr val="accent1">
                     <a:lumMod val="75000"/>
@@ -5643,8 +5715,16 @@
                 </a:solidFill>
                 <a:latin typeface="Arial Narrow" panose="020B0606020202030204" pitchFamily="34" charset="0"/>
               </a:rPr>
-              <a:t>12</a:t>
-            </a:r>
+              <a:t>2</a:t>
+            </a:r>
+            <a:endParaRPr lang="de-DE" sz="12400" b="1" dirty="0">
+              <a:solidFill>
+                <a:schemeClr val="accent1">
+                  <a:lumMod val="75000"/>
+                </a:schemeClr>
+              </a:solidFill>
+              <a:latin typeface="Arial Narrow" panose="020B0606020202030204" pitchFamily="34" charset="0"/>
+            </a:endParaRPr>
           </a:p>
         </p:txBody>
       </p:sp>
@@ -5760,7 +5840,7 @@
           <a:p>
             <a:pPr algn="ctr"/>
             <a:r>
-              <a:rPr lang="de-DE" sz="12400" b="1" dirty="0">
+              <a:rPr lang="de-DE" sz="12400" b="1" dirty="0" smtClean="0">
                 <a:solidFill>
                   <a:schemeClr val="accent1">
                     <a:lumMod val="75000"/>
@@ -5768,8 +5848,16 @@
                 </a:solidFill>
                 <a:latin typeface="Arial Narrow" panose="020B0606020202030204" pitchFamily="34" charset="0"/>
               </a:rPr>
-              <a:t>3</a:t>
-            </a:r>
+              <a:t>11</a:t>
+            </a:r>
+            <a:endParaRPr lang="de-DE" sz="12400" b="1" dirty="0">
+              <a:solidFill>
+                <a:schemeClr val="accent1">
+                  <a:lumMod val="75000"/>
+                </a:schemeClr>
+              </a:solidFill>
+              <a:latin typeface="Arial Narrow" panose="020B0606020202030204" pitchFamily="34" charset="0"/>
+            </a:endParaRPr>
           </a:p>
         </p:txBody>
       </p:sp>
@@ -5827,7 +5915,7 @@
           <a:p>
             <a:pPr algn="ctr"/>
             <a:r>
-              <a:rPr lang="de-DE" sz="12400" b="1" dirty="0">
+              <a:rPr lang="de-DE" sz="12400" b="1" dirty="0" smtClean="0">
                 <a:solidFill>
                   <a:schemeClr val="accent1">
                     <a:lumMod val="75000"/>
@@ -5835,8 +5923,16 @@
                 </a:solidFill>
                 <a:latin typeface="Arial Narrow" panose="020B0606020202030204" pitchFamily="34" charset="0"/>
               </a:rPr>
-              <a:t>5</a:t>
-            </a:r>
+              <a:t>9</a:t>
+            </a:r>
+            <a:endParaRPr lang="de-DE" sz="12400" b="1" dirty="0">
+              <a:solidFill>
+                <a:schemeClr val="accent1">
+                  <a:lumMod val="75000"/>
+                </a:schemeClr>
+              </a:solidFill>
+              <a:latin typeface="Arial Narrow" panose="020B0606020202030204" pitchFamily="34" charset="0"/>
+            </a:endParaRPr>
           </a:p>
         </p:txBody>
       </p:sp>
@@ -5894,7 +5990,7 @@
           <a:p>
             <a:pPr algn="ctr"/>
             <a:r>
-              <a:rPr lang="de-DE" sz="12400" b="1" dirty="0">
+              <a:rPr lang="de-DE" sz="12400" b="1" dirty="0" smtClean="0">
                 <a:solidFill>
                   <a:schemeClr val="accent1">
                     <a:lumMod val="75000"/>
@@ -5902,8 +5998,16 @@
                 </a:solidFill>
                 <a:latin typeface="Arial Narrow" panose="020B0606020202030204" pitchFamily="34" charset="0"/>
               </a:rPr>
-              <a:t>11</a:t>
-            </a:r>
+              <a:t>3</a:t>
+            </a:r>
+            <a:endParaRPr lang="de-DE" sz="12400" b="1" dirty="0">
+              <a:solidFill>
+                <a:schemeClr val="accent1">
+                  <a:lumMod val="75000"/>
+                </a:schemeClr>
+              </a:solidFill>
+              <a:latin typeface="Arial Narrow" panose="020B0606020202030204" pitchFamily="34" charset="0"/>
+            </a:endParaRPr>
           </a:p>
         </p:txBody>
       </p:sp>
@@ -7129,7 +7233,7 @@
       </p:sp>
       <p:pic>
         <p:nvPicPr>
-          <p:cNvPr id="3074" name="Picture 2"/>
+          <p:cNvPr id="1026" name="Picture 2"/>
           <p:cNvPicPr>
             <a:picLocks noChangeAspect="1" noChangeArrowheads="1"/>
           </p:cNvPicPr>
@@ -12320,29 +12424,7 @@
                   </a:schemeClr>
                 </a:solidFill>
               </a:rPr>
-              <a:t>1       3           6          10        15          21         28         36         45         55        </a:t>
-            </a:r>
-            <a:r>
-              <a:rPr lang="de-DE" sz="5400" b="1" dirty="0" smtClean="0">
-                <a:solidFill>
-                  <a:schemeClr val="tx1">
-                    <a:lumMod val="65000"/>
-                    <a:lumOff val="35000"/>
-                  </a:schemeClr>
-                </a:solidFill>
-              </a:rPr>
-              <a:t>66        </a:t>
-            </a:r>
-            <a:r>
-              <a:rPr lang="de-DE" sz="5400" b="1" dirty="0" smtClean="0">
-                <a:solidFill>
-                  <a:schemeClr val="tx1">
-                    <a:lumMod val="65000"/>
-                    <a:lumOff val="35000"/>
-                  </a:schemeClr>
-                </a:solidFill>
-              </a:rPr>
-              <a:t>78</a:t>
+              <a:t>1       3           6          10        15          21         28         36         45         55        66        78</a:t>
             </a:r>
           </a:p>
           <a:p>
@@ -16193,29 +16275,7 @@
                   </a:schemeClr>
                 </a:solidFill>
               </a:rPr>
-              <a:t>1       3           6          10        15          21         28         36         45         55        </a:t>
-            </a:r>
-            <a:r>
-              <a:rPr lang="de-DE" sz="5400" b="1" dirty="0" smtClean="0">
-                <a:solidFill>
-                  <a:schemeClr val="tx1">
-                    <a:lumMod val="65000"/>
-                    <a:lumOff val="35000"/>
-                  </a:schemeClr>
-                </a:solidFill>
-              </a:rPr>
-              <a:t>66        </a:t>
-            </a:r>
-            <a:r>
-              <a:rPr lang="de-DE" sz="5400" b="1" dirty="0" smtClean="0">
-                <a:solidFill>
-                  <a:schemeClr val="tx1">
-                    <a:lumMod val="65000"/>
-                    <a:lumOff val="35000"/>
-                  </a:schemeClr>
-                </a:solidFill>
-              </a:rPr>
-              <a:t>78</a:t>
+              <a:t>1       3           6          10        15          21         28         36         45         55        66        78</a:t>
             </a:r>
           </a:p>
           <a:p>

</xml_diff>

<commit_message>
Mostly usability and beautifying
</commit_message>
<xml_diff>
--- a/helper/Presentation1.pptx
+++ b/helper/Presentation1.pptx
@@ -3319,9 +3319,7 @@
             </a:schemeClr>
           </a:solidFill>
           <a:ln w="38100">
-            <a:solidFill>
-              <a:schemeClr val="tx1"/>
-            </a:solidFill>
+            <a:noFill/>
           </a:ln>
         </p:spPr>
         <p:style>
@@ -3700,7 +3698,7 @@
       </p:sp>
       <p:pic>
         <p:nvPicPr>
-          <p:cNvPr id="4" name="Picture 2"/>
+          <p:cNvPr id="1026" name="Picture 2"/>
           <p:cNvPicPr>
             <a:picLocks noChangeAspect="1" noChangeArrowheads="1"/>
           </p:cNvPicPr>
@@ -3721,8 +3719,8 @@
         </p:blipFill>
         <p:spPr bwMode="auto">
           <a:xfrm>
-            <a:off x="-8543924" y="-4713287"/>
-            <a:ext cx="10493345" cy="6513531"/>
+            <a:off x="-8526462" y="-4694237"/>
+            <a:ext cx="10478713" cy="6498899"/>
           </a:xfrm>
           <a:prstGeom prst="rect">
             <a:avLst/>
@@ -3884,9 +3882,7 @@
             </a:schemeClr>
           </a:solidFill>
           <a:ln w="38100">
-            <a:solidFill>
-              <a:schemeClr val="tx1"/>
-            </a:solidFill>
+            <a:noFill/>
           </a:ln>
         </p:spPr>
         <p:style>
@@ -5626,7 +5622,7 @@
       </p:sp>
       <p:pic>
         <p:nvPicPr>
-          <p:cNvPr id="4" name="Picture 2"/>
+          <p:cNvPr id="2050" name="Picture 2"/>
           <p:cNvPicPr>
             <a:picLocks noChangeAspect="1" noChangeArrowheads="1"/>
           </p:cNvPicPr>
@@ -5647,8 +5643,8 @@
         </p:blipFill>
         <p:spPr bwMode="auto">
           <a:xfrm>
-            <a:off x="-6589240" y="-387424"/>
-            <a:ext cx="10525047" cy="6513531"/>
+            <a:off x="-8574088" y="-4694237"/>
+            <a:ext cx="10517731" cy="6498899"/>
           </a:xfrm>
           <a:prstGeom prst="rect">
             <a:avLst/>
@@ -5810,9 +5806,7 @@
             </a:schemeClr>
           </a:solidFill>
           <a:ln w="38100">
-            <a:solidFill>
-              <a:schemeClr val="tx1"/>
-            </a:solidFill>
+            <a:noFill/>
           </a:ln>
         </p:spPr>
         <p:style>
@@ -9889,7 +9883,7 @@
       </p:sp>
       <p:pic>
         <p:nvPicPr>
-          <p:cNvPr id="1026" name="Picture 2"/>
+          <p:cNvPr id="3074" name="Picture 2"/>
           <p:cNvPicPr>
             <a:picLocks noChangeAspect="1" noChangeArrowheads="1"/>
           </p:cNvPicPr>
@@ -9910,8 +9904,8 @@
         </p:blipFill>
         <p:spPr bwMode="auto">
           <a:xfrm>
-            <a:off x="-8583613" y="-4806950"/>
-            <a:ext cx="10525047" cy="6589128"/>
+            <a:off x="-8574088" y="-4797425"/>
+            <a:ext cx="10517731" cy="6581812"/>
           </a:xfrm>
           <a:prstGeom prst="rect">
             <a:avLst/>

</xml_diff>

<commit_message>
Added part of AI and fix on graphics
</commit_message>
<xml_diff>
--- a/helper/Presentation1.pptx
+++ b/helper/Presentation1.pptx
@@ -317,7 +317,7 @@
           <a:p>
             <a:fld id="{28B99DBD-F96E-4E52-AFE7-5C3094D82A8D}" type="datetimeFigureOut">
               <a:rPr lang="de-DE" smtClean="0"/>
-              <a:t>05.07.2014</a:t>
+              <a:t>07.07.2014</a:t>
             </a:fld>
             <a:endParaRPr lang="de-DE"/>
           </a:p>
@@ -487,7 +487,7 @@
           <a:p>
             <a:fld id="{28B99DBD-F96E-4E52-AFE7-5C3094D82A8D}" type="datetimeFigureOut">
               <a:rPr lang="de-DE" smtClean="0"/>
-              <a:t>05.07.2014</a:t>
+              <a:t>07.07.2014</a:t>
             </a:fld>
             <a:endParaRPr lang="de-DE"/>
           </a:p>
@@ -667,7 +667,7 @@
           <a:p>
             <a:fld id="{28B99DBD-F96E-4E52-AFE7-5C3094D82A8D}" type="datetimeFigureOut">
               <a:rPr lang="de-DE" smtClean="0"/>
-              <a:t>05.07.2014</a:t>
+              <a:t>07.07.2014</a:t>
             </a:fld>
             <a:endParaRPr lang="de-DE"/>
           </a:p>
@@ -837,7 +837,7 @@
           <a:p>
             <a:fld id="{28B99DBD-F96E-4E52-AFE7-5C3094D82A8D}" type="datetimeFigureOut">
               <a:rPr lang="de-DE" smtClean="0"/>
-              <a:t>05.07.2014</a:t>
+              <a:t>07.07.2014</a:t>
             </a:fld>
             <a:endParaRPr lang="de-DE"/>
           </a:p>
@@ -1083,7 +1083,7 @@
           <a:p>
             <a:fld id="{28B99DBD-F96E-4E52-AFE7-5C3094D82A8D}" type="datetimeFigureOut">
               <a:rPr lang="de-DE" smtClean="0"/>
-              <a:t>05.07.2014</a:t>
+              <a:t>07.07.2014</a:t>
             </a:fld>
             <a:endParaRPr lang="de-DE"/>
           </a:p>
@@ -1371,7 +1371,7 @@
           <a:p>
             <a:fld id="{28B99DBD-F96E-4E52-AFE7-5C3094D82A8D}" type="datetimeFigureOut">
               <a:rPr lang="de-DE" smtClean="0"/>
-              <a:t>05.07.2014</a:t>
+              <a:t>07.07.2014</a:t>
             </a:fld>
             <a:endParaRPr lang="de-DE"/>
           </a:p>
@@ -1793,7 +1793,7 @@
           <a:p>
             <a:fld id="{28B99DBD-F96E-4E52-AFE7-5C3094D82A8D}" type="datetimeFigureOut">
               <a:rPr lang="de-DE" smtClean="0"/>
-              <a:t>05.07.2014</a:t>
+              <a:t>07.07.2014</a:t>
             </a:fld>
             <a:endParaRPr lang="de-DE"/>
           </a:p>
@@ -1911,7 +1911,7 @@
           <a:p>
             <a:fld id="{28B99DBD-F96E-4E52-AFE7-5C3094D82A8D}" type="datetimeFigureOut">
               <a:rPr lang="de-DE" smtClean="0"/>
-              <a:t>05.07.2014</a:t>
+              <a:t>07.07.2014</a:t>
             </a:fld>
             <a:endParaRPr lang="de-DE"/>
           </a:p>
@@ -2006,7 +2006,7 @@
           <a:p>
             <a:fld id="{28B99DBD-F96E-4E52-AFE7-5C3094D82A8D}" type="datetimeFigureOut">
               <a:rPr lang="de-DE" smtClean="0"/>
-              <a:t>05.07.2014</a:t>
+              <a:t>07.07.2014</a:t>
             </a:fld>
             <a:endParaRPr lang="de-DE"/>
           </a:p>
@@ -2283,7 +2283,7 @@
           <a:p>
             <a:fld id="{28B99DBD-F96E-4E52-AFE7-5C3094D82A8D}" type="datetimeFigureOut">
               <a:rPr lang="de-DE" smtClean="0"/>
-              <a:t>05.07.2014</a:t>
+              <a:t>07.07.2014</a:t>
             </a:fld>
             <a:endParaRPr lang="de-DE"/>
           </a:p>
@@ -2536,7 +2536,7 @@
           <a:p>
             <a:fld id="{28B99DBD-F96E-4E52-AFE7-5C3094D82A8D}" type="datetimeFigureOut">
               <a:rPr lang="de-DE" smtClean="0"/>
-              <a:t>05.07.2014</a:t>
+              <a:t>07.07.2014</a:t>
             </a:fld>
             <a:endParaRPr lang="de-DE"/>
           </a:p>
@@ -2749,7 +2749,7 @@
           <a:p>
             <a:fld id="{28B99DBD-F96E-4E52-AFE7-5C3094D82A8D}" type="datetimeFigureOut">
               <a:rPr lang="de-DE" smtClean="0"/>
-              <a:t>05.07.2014</a:t>
+              <a:t>07.07.2014</a:t>
             </a:fld>
             <a:endParaRPr lang="de-DE"/>
           </a:p>
@@ -3725,7 +3725,15 @@
             <a:pPr algn="ctr"/>
             <a:r>
               <a:rPr lang="de-DE" sz="4400" dirty="0" smtClean="0"/>
-              <a:t>Click her </a:t>
+              <a:t>Click </a:t>
+            </a:r>
+            <a:r>
+              <a:rPr lang="de-DE" sz="4400" dirty="0" err="1" smtClean="0"/>
+              <a:t>here</a:t>
+            </a:r>
+            <a:r>
+              <a:rPr lang="de-DE" sz="4400" dirty="0" smtClean="0"/>
+              <a:t> </a:t>
             </a:r>
             <a:r>
               <a:rPr lang="de-DE" sz="4400" dirty="0" err="1" smtClean="0"/>
@@ -3813,7 +3821,7 @@
       </p:sp>
       <p:pic>
         <p:nvPicPr>
-          <p:cNvPr id="1026" name="Picture 2"/>
+          <p:cNvPr id="5" name="Picture 2"/>
           <p:cNvPicPr>
             <a:picLocks noChangeAspect="1" noChangeArrowheads="1"/>
           </p:cNvPicPr>
@@ -3821,70 +3829,6 @@
         </p:nvPicPr>
         <p:blipFill>
           <a:blip r:embed="rId2" cstate="print">
-            <a:extLst>
-              <a:ext uri="{28A0092B-C50C-407E-A947-70E740481C1C}">
-                <a14:useLocalDpi xmlns:a14="http://schemas.microsoft.com/office/drawing/2010/main" val="0"/>
-              </a:ext>
-            </a:extLst>
-          </a:blip>
-          <a:srcRect/>
-          <a:stretch>
-            <a:fillRect/>
-          </a:stretch>
-        </p:blipFill>
-        <p:spPr bwMode="auto">
-          <a:xfrm>
-            <a:off x="-8526462" y="-4694237"/>
-            <a:ext cx="10478713" cy="6498899"/>
-          </a:xfrm>
-          <a:prstGeom prst="rect">
-            <a:avLst/>
-          </a:prstGeom>
-          <a:noFill/>
-          <a:ln>
-            <a:noFill/>
-          </a:ln>
-          <a:effectLst/>
-          <a:extLst>
-            <a:ext uri="{909E8E84-426E-40DD-AFC4-6F175D3DCCD1}">
-              <a14:hiddenFill xmlns:a14="http://schemas.microsoft.com/office/drawing/2010/main">
-                <a:solidFill>
-                  <a:schemeClr val="accent1"/>
-                </a:solidFill>
-              </a14:hiddenFill>
-            </a:ext>
-            <a:ext uri="{91240B29-F687-4F45-9708-019B960494DF}">
-              <a14:hiddenLine xmlns:a14="http://schemas.microsoft.com/office/drawing/2010/main" w="9525">
-                <a:solidFill>
-                  <a:schemeClr val="tx1"/>
-                </a:solidFill>
-                <a:miter lim="800000"/>
-                <a:headEnd/>
-                <a:tailEnd/>
-              </a14:hiddenLine>
-            </a:ext>
-            <a:ext uri="{AF507438-7753-43E0-B8FC-AC1667EBCBE1}">
-              <a14:hiddenEffects xmlns:a14="http://schemas.microsoft.com/office/drawing/2010/main">
-                <a:effectLst>
-                  <a:outerShdw dist="35921" dir="2700000" algn="ctr" rotWithShape="0">
-                    <a:schemeClr val="bg2"/>
-                  </a:outerShdw>
-                </a:effectLst>
-              </a14:hiddenEffects>
-            </a:ext>
-          </a:extLst>
-        </p:spPr>
-      </p:pic>
-      <p:pic>
-        <p:nvPicPr>
-          <p:cNvPr id="4" name="Picture 2"/>
-          <p:cNvPicPr>
-            <a:picLocks noChangeAspect="1" noChangeArrowheads="1"/>
-          </p:cNvPicPr>
-          <p:nvPr/>
-        </p:nvPicPr>
-        <p:blipFill>
-          <a:blip r:embed="rId3" cstate="print">
             <a:extLst>
               <a:ext uri="{28A0092B-C50C-407E-A947-70E740481C1C}">
                 <a14:useLocalDpi xmlns:a14="http://schemas.microsoft.com/office/drawing/2010/main" val="0"/>

</xml_diff>